<commit_message>
Add ER in PPT
</commit_message>
<xml_diff>
--- a/docs/课程项目提交与答辩管理系统_汇报PPT.pptx
+++ b/docs/课程项目提交与答辩管理系统_汇报PPT.pptx
@@ -73,13 +73,13 @@
         </a:solidFill>
         <a:effectLst/>
         <a:uFillTx/>
-        <a:latin typeface="+mj-lt"/>
-        <a:ea typeface="+mj-ea"/>
-        <a:cs typeface="+mj-cs"/>
-        <a:sym typeface="Calibri"/>
+        <a:latin typeface="+mn-lt"/>
+        <a:ea typeface="+mn-ea"/>
+        <a:cs typeface="+mn-cs"/>
+        <a:sym typeface="Helvetica"/>
       </a:defRPr>
     </a:lvl1pPr>
-    <a:lvl2pPr marL="0" marR="0" indent="457200" algn="l" defTabSz="457200" rtl="0" fontAlgn="auto" latinLnBrk="0" hangingPunct="0">
+    <a:lvl2pPr marL="0" marR="0" indent="0" algn="l" defTabSz="457200" rtl="0" fontAlgn="auto" latinLnBrk="0" hangingPunct="0">
       <a:lnSpc>
         <a:spcPct val="100000"/>
       </a:lnSpc>
@@ -103,13 +103,13 @@
         </a:solidFill>
         <a:effectLst/>
         <a:uFillTx/>
-        <a:latin typeface="+mj-lt"/>
-        <a:ea typeface="+mj-ea"/>
-        <a:cs typeface="+mj-cs"/>
-        <a:sym typeface="Calibri"/>
+        <a:latin typeface="+mn-lt"/>
+        <a:ea typeface="+mn-ea"/>
+        <a:cs typeface="+mn-cs"/>
+        <a:sym typeface="Helvetica"/>
       </a:defRPr>
     </a:lvl2pPr>
-    <a:lvl3pPr marL="0" marR="0" indent="914400" algn="l" defTabSz="457200" rtl="0" fontAlgn="auto" latinLnBrk="0" hangingPunct="0">
+    <a:lvl3pPr marL="0" marR="0" indent="0" algn="l" defTabSz="457200" rtl="0" fontAlgn="auto" latinLnBrk="0" hangingPunct="0">
       <a:lnSpc>
         <a:spcPct val="100000"/>
       </a:lnSpc>
@@ -133,13 +133,13 @@
         </a:solidFill>
         <a:effectLst/>
         <a:uFillTx/>
-        <a:latin typeface="+mj-lt"/>
-        <a:ea typeface="+mj-ea"/>
-        <a:cs typeface="+mj-cs"/>
-        <a:sym typeface="Calibri"/>
+        <a:latin typeface="+mn-lt"/>
+        <a:ea typeface="+mn-ea"/>
+        <a:cs typeface="+mn-cs"/>
+        <a:sym typeface="Helvetica"/>
       </a:defRPr>
     </a:lvl3pPr>
-    <a:lvl4pPr marL="0" marR="0" indent="1371600" algn="l" defTabSz="457200" rtl="0" fontAlgn="auto" latinLnBrk="0" hangingPunct="0">
+    <a:lvl4pPr marL="0" marR="0" indent="0" algn="l" defTabSz="457200" rtl="0" fontAlgn="auto" latinLnBrk="0" hangingPunct="0">
       <a:lnSpc>
         <a:spcPct val="100000"/>
       </a:lnSpc>
@@ -163,13 +163,13 @@
         </a:solidFill>
         <a:effectLst/>
         <a:uFillTx/>
-        <a:latin typeface="+mj-lt"/>
-        <a:ea typeface="+mj-ea"/>
-        <a:cs typeface="+mj-cs"/>
-        <a:sym typeface="Calibri"/>
+        <a:latin typeface="+mn-lt"/>
+        <a:ea typeface="+mn-ea"/>
+        <a:cs typeface="+mn-cs"/>
+        <a:sym typeface="Helvetica"/>
       </a:defRPr>
     </a:lvl4pPr>
-    <a:lvl5pPr marL="0" marR="0" indent="1828800" algn="l" defTabSz="457200" rtl="0" fontAlgn="auto" latinLnBrk="0" hangingPunct="0">
+    <a:lvl5pPr marL="0" marR="0" indent="0" algn="l" defTabSz="457200" rtl="0" fontAlgn="auto" latinLnBrk="0" hangingPunct="0">
       <a:lnSpc>
         <a:spcPct val="100000"/>
       </a:lnSpc>
@@ -193,13 +193,13 @@
         </a:solidFill>
         <a:effectLst/>
         <a:uFillTx/>
-        <a:latin typeface="+mj-lt"/>
-        <a:ea typeface="+mj-ea"/>
-        <a:cs typeface="+mj-cs"/>
-        <a:sym typeface="Calibri"/>
+        <a:latin typeface="+mn-lt"/>
+        <a:ea typeface="+mn-ea"/>
+        <a:cs typeface="+mn-cs"/>
+        <a:sym typeface="Helvetica"/>
       </a:defRPr>
     </a:lvl5pPr>
-    <a:lvl6pPr marL="0" marR="0" indent="2286000" algn="l" defTabSz="457200" rtl="0" fontAlgn="auto" latinLnBrk="0" hangingPunct="0">
+    <a:lvl6pPr marL="0" marR="0" indent="0" algn="l" defTabSz="457200" rtl="0" fontAlgn="auto" latinLnBrk="0" hangingPunct="0">
       <a:lnSpc>
         <a:spcPct val="100000"/>
       </a:lnSpc>
@@ -223,13 +223,13 @@
         </a:solidFill>
         <a:effectLst/>
         <a:uFillTx/>
-        <a:latin typeface="+mj-lt"/>
-        <a:ea typeface="+mj-ea"/>
-        <a:cs typeface="+mj-cs"/>
-        <a:sym typeface="Calibri"/>
+        <a:latin typeface="+mn-lt"/>
+        <a:ea typeface="+mn-ea"/>
+        <a:cs typeface="+mn-cs"/>
+        <a:sym typeface="Helvetica"/>
       </a:defRPr>
     </a:lvl6pPr>
-    <a:lvl7pPr marL="0" marR="0" indent="2743200" algn="l" defTabSz="457200" rtl="0" fontAlgn="auto" latinLnBrk="0" hangingPunct="0">
+    <a:lvl7pPr marL="0" marR="0" indent="0" algn="l" defTabSz="457200" rtl="0" fontAlgn="auto" latinLnBrk="0" hangingPunct="0">
       <a:lnSpc>
         <a:spcPct val="100000"/>
       </a:lnSpc>
@@ -253,13 +253,13 @@
         </a:solidFill>
         <a:effectLst/>
         <a:uFillTx/>
-        <a:latin typeface="+mj-lt"/>
-        <a:ea typeface="+mj-ea"/>
-        <a:cs typeface="+mj-cs"/>
-        <a:sym typeface="Calibri"/>
+        <a:latin typeface="+mn-lt"/>
+        <a:ea typeface="+mn-ea"/>
+        <a:cs typeface="+mn-cs"/>
+        <a:sym typeface="Helvetica"/>
       </a:defRPr>
     </a:lvl7pPr>
-    <a:lvl8pPr marL="0" marR="0" indent="3200400" algn="l" defTabSz="457200" rtl="0" fontAlgn="auto" latinLnBrk="0" hangingPunct="0">
+    <a:lvl8pPr marL="0" marR="0" indent="0" algn="l" defTabSz="457200" rtl="0" fontAlgn="auto" latinLnBrk="0" hangingPunct="0">
       <a:lnSpc>
         <a:spcPct val="100000"/>
       </a:lnSpc>
@@ -283,13 +283,13 @@
         </a:solidFill>
         <a:effectLst/>
         <a:uFillTx/>
-        <a:latin typeface="+mj-lt"/>
-        <a:ea typeface="+mj-ea"/>
-        <a:cs typeface="+mj-cs"/>
-        <a:sym typeface="Calibri"/>
+        <a:latin typeface="+mn-lt"/>
+        <a:ea typeface="+mn-ea"/>
+        <a:cs typeface="+mn-cs"/>
+        <a:sym typeface="Helvetica"/>
       </a:defRPr>
     </a:lvl8pPr>
-    <a:lvl9pPr marL="0" marR="0" indent="3657600" algn="l" defTabSz="457200" rtl="0" fontAlgn="auto" latinLnBrk="0" hangingPunct="0">
+    <a:lvl9pPr marL="0" marR="0" indent="0" algn="l" defTabSz="457200" rtl="0" fontAlgn="auto" latinLnBrk="0" hangingPunct="0">
       <a:lnSpc>
         <a:spcPct val="100000"/>
       </a:lnSpc>
@@ -313,10 +313,10 @@
         </a:solidFill>
         <a:effectLst/>
         <a:uFillTx/>
-        <a:latin typeface="+mj-lt"/>
-        <a:ea typeface="+mj-ea"/>
-        <a:cs typeface="+mj-cs"/>
-        <a:sym typeface="Calibri"/>
+        <a:latin typeface="+mn-lt"/>
+        <a:ea typeface="+mn-ea"/>
+        <a:cs typeface="+mn-cs"/>
+        <a:sym typeface="Helvetica"/>
       </a:defRPr>
     </a:lvl9pPr>
   </p:defaultTextStyle>
@@ -549,7 +549,7 @@
                 </a:solidFill>
               </a:defRPr>
             </a:lvl1pPr>
-            <a:lvl2pPr marL="0" indent="457200" algn="ctr">
+            <a:lvl2pPr marL="0" indent="0" algn="ctr">
               <a:buSzTx/>
               <a:buFontTx/>
               <a:buNone/>
@@ -559,7 +559,7 @@
                 </a:solidFill>
               </a:defRPr>
             </a:lvl2pPr>
-            <a:lvl3pPr marL="0" indent="914400" algn="ctr">
+            <a:lvl3pPr marL="0" indent="0" algn="ctr">
               <a:buSzTx/>
               <a:buFontTx/>
               <a:buNone/>
@@ -569,7 +569,7 @@
                 </a:solidFill>
               </a:defRPr>
             </a:lvl3pPr>
-            <a:lvl4pPr marL="0" indent="1371600" algn="ctr">
+            <a:lvl4pPr marL="0" indent="0" algn="ctr">
               <a:buSzTx/>
               <a:buFontTx/>
               <a:buNone/>
@@ -579,7 +579,7 @@
                 </a:solidFill>
               </a:defRPr>
             </a:lvl4pPr>
-            <a:lvl5pPr marL="0" indent="1828800" algn="ctr">
+            <a:lvl5pPr marL="0" indent="0" algn="ctr">
               <a:buSzTx/>
               <a:buFontTx/>
               <a:buNone/>
@@ -833,7 +833,7 @@
         <p:spPr>
           <a:xfrm>
             <a:off x="722312" y="2906713"/>
-            <a:ext cx="7772401" cy="1500188"/>
+            <a:ext cx="7772401" cy="1500189"/>
           </a:xfrm>
           <a:prstGeom prst="rect">
             <a:avLst/>
@@ -855,7 +855,7 @@
                 </a:solidFill>
               </a:defRPr>
             </a:lvl1pPr>
-            <a:lvl2pPr marL="0" indent="457200">
+            <a:lvl2pPr marL="0" indent="0">
               <a:spcBef>
                 <a:spcPts val="400"/>
               </a:spcBef>
@@ -868,7 +868,7 @@
                 </a:solidFill>
               </a:defRPr>
             </a:lvl2pPr>
-            <a:lvl3pPr marL="0" indent="914400">
+            <a:lvl3pPr marL="0" indent="0">
               <a:spcBef>
                 <a:spcPts val="400"/>
               </a:spcBef>
@@ -881,7 +881,7 @@
                 </a:solidFill>
               </a:defRPr>
             </a:lvl3pPr>
-            <a:lvl4pPr marL="0" indent="1371600">
+            <a:lvl4pPr marL="0" indent="0">
               <a:spcBef>
                 <a:spcPts val="400"/>
               </a:spcBef>
@@ -894,7 +894,7 @@
                 </a:solidFill>
               </a:defRPr>
             </a:lvl4pPr>
-            <a:lvl5pPr marL="0" indent="1828800">
+            <a:lvl5pPr marL="0" indent="0">
               <a:spcBef>
                 <a:spcPts val="400"/>
               </a:spcBef>
@@ -1044,7 +1044,7 @@
               </a:spcBef>
               <a:defRPr sz="2800"/>
             </a:lvl2pPr>
-            <a:lvl3pPr marL="1234439" indent="-320039">
+            <a:lvl3pPr marL="1234438" indent="-320038">
               <a:spcBef>
                 <a:spcPts val="600"/>
               </a:spcBef>
@@ -1196,7 +1196,7 @@
               <a:buNone/>
               <a:defRPr b="1" sz="2400"/>
             </a:lvl1pPr>
-            <a:lvl2pPr marL="0" indent="457200">
+            <a:lvl2pPr marL="0" indent="0">
               <a:spcBef>
                 <a:spcPts val="500"/>
               </a:spcBef>
@@ -1205,7 +1205,7 @@
               <a:buNone/>
               <a:defRPr b="1" sz="2400"/>
             </a:lvl2pPr>
-            <a:lvl3pPr marL="0" indent="914400">
+            <a:lvl3pPr marL="0" indent="0">
               <a:spcBef>
                 <a:spcPts val="500"/>
               </a:spcBef>
@@ -1214,7 +1214,7 @@
               <a:buNone/>
               <a:defRPr b="1" sz="2400"/>
             </a:lvl3pPr>
-            <a:lvl4pPr marL="0" indent="1371600">
+            <a:lvl4pPr marL="0" indent="0">
               <a:spcBef>
                 <a:spcPts val="500"/>
               </a:spcBef>
@@ -1223,7 +1223,7 @@
               <a:buNone/>
               <a:defRPr b="1" sz="2400"/>
             </a:lvl4pPr>
-            <a:lvl5pPr marL="0" indent="1828800">
+            <a:lvl5pPr marL="0" indent="0">
               <a:spcBef>
                 <a:spcPts val="500"/>
               </a:spcBef>
@@ -1275,8 +1275,8 @@
         </p:nvSpPr>
         <p:spPr>
           <a:xfrm>
-            <a:off x="4645025" y="1535112"/>
-            <a:ext cx="4041775" cy="639763"/>
+            <a:off x="4645025" y="1535111"/>
+            <a:ext cx="4041775" cy="639765"/>
           </a:xfrm>
           <a:prstGeom prst="rect">
             <a:avLst/>
@@ -1286,15 +1286,7 @@
           <a:bodyPr anchor="b"/>
           <a:lstStyle/>
           <a:p>
-            <a:pPr marL="0" indent="0">
-              <a:spcBef>
-                <a:spcPts val="500"/>
-              </a:spcBef>
-              <a:buSzTx/>
-              <a:buFontTx/>
-              <a:buNone/>
-              <a:defRPr b="1" sz="2400"/>
-            </a:pPr>
+            <a:pPr/>
           </a:p>
         </p:txBody>
       </p:sp>
@@ -1477,7 +1469,7 @@
         <p:spPr>
           <a:xfrm>
             <a:off x="457200" y="273050"/>
-            <a:ext cx="3008314" cy="1162050"/>
+            <a:ext cx="3008315" cy="1162050"/>
           </a:xfrm>
           <a:prstGeom prst="rect">
             <a:avLst/>
@@ -1560,8 +1552,8 @@
         </p:nvSpPr>
         <p:spPr>
           <a:xfrm>
-            <a:off x="457199" y="1435100"/>
-            <a:ext cx="3008315" cy="4691063"/>
+            <a:off x="457198" y="1435100"/>
+            <a:ext cx="3008316" cy="4691063"/>
           </a:xfrm>
           <a:prstGeom prst="rect">
             <a:avLst/>
@@ -1571,15 +1563,7 @@
           <a:bodyPr/>
           <a:lstStyle/>
           <a:p>
-            <a:pPr marL="0" indent="0">
-              <a:spcBef>
-                <a:spcPts val="300"/>
-              </a:spcBef>
-              <a:buSzTx/>
-              <a:buFontTx/>
-              <a:buNone/>
-              <a:defRPr sz="1400"/>
-            </a:pPr>
+            <a:pPr/>
           </a:p>
         </p:txBody>
       </p:sp>
@@ -1642,7 +1626,7 @@
         <p:spPr>
           <a:xfrm>
             <a:off x="1792288" y="4800600"/>
-            <a:ext cx="5486401" cy="566738"/>
+            <a:ext cx="5486402" cy="566738"/>
           </a:xfrm>
           <a:prstGeom prst="rect">
             <a:avLst/>
@@ -1674,14 +1658,14 @@
         <p:spPr>
           <a:xfrm>
             <a:off x="1792288" y="612775"/>
-            <a:ext cx="5486401" cy="4114800"/>
+            <a:ext cx="5486402" cy="4114800"/>
           </a:xfrm>
           <a:prstGeom prst="rect">
             <a:avLst/>
           </a:prstGeom>
         </p:spPr>
         <p:txBody>
-          <a:bodyPr lIns="91439" rIns="91439">
+          <a:bodyPr lIns="91439" tIns="45719" rIns="91439" bIns="45719">
             <a:noAutofit/>
           </a:bodyPr>
           <a:lstStyle/>
@@ -1701,7 +1685,7 @@
         <p:spPr>
           <a:xfrm>
             <a:off x="1792288" y="5367337"/>
-            <a:ext cx="5486401" cy="804863"/>
+            <a:ext cx="5486402" cy="804864"/>
           </a:xfrm>
           <a:prstGeom prst="rect">
             <a:avLst/>
@@ -1719,7 +1703,7 @@
               <a:buNone/>
               <a:defRPr sz="1400"/>
             </a:lvl1pPr>
-            <a:lvl2pPr marL="0" indent="457200">
+            <a:lvl2pPr marL="0" indent="0">
               <a:spcBef>
                 <a:spcPts val="300"/>
               </a:spcBef>
@@ -1728,7 +1712,7 @@
               <a:buNone/>
               <a:defRPr sz="1400"/>
             </a:lvl2pPr>
-            <a:lvl3pPr marL="0" indent="914400">
+            <a:lvl3pPr marL="0" indent="0">
               <a:spcBef>
                 <a:spcPts val="300"/>
               </a:spcBef>
@@ -1737,7 +1721,7 @@
               <a:buNone/>
               <a:defRPr sz="1400"/>
             </a:lvl3pPr>
-            <a:lvl4pPr marL="0" indent="1371600">
+            <a:lvl4pPr marL="0" indent="0">
               <a:spcBef>
                 <a:spcPts val="300"/>
               </a:spcBef>
@@ -1746,7 +1730,7 @@
               <a:buNone/>
               <a:defRPr sz="1400"/>
             </a:lvl4pPr>
-            <a:lvl5pPr marL="0" indent="1828800">
+            <a:lvl5pPr marL="0" indent="0">
               <a:spcBef>
                 <a:spcPts val="300"/>
               </a:spcBef>
@@ -1869,7 +1853,7 @@
           </a:extLst>
         </p:spPr>
         <p:txBody>
-          <a:bodyPr lIns="45719" rIns="45719" anchor="ctr">
+          <a:bodyPr lIns="45718" tIns="45718" rIns="45718" bIns="45718" anchor="ctr">
             <a:normAutofit fontScale="100000" lnSpcReduction="0"/>
           </a:bodyPr>
           <a:lstStyle/>
@@ -1907,7 +1891,7 @@
           </a:extLst>
         </p:spPr>
         <p:txBody>
-          <a:bodyPr lIns="45719" rIns="45719">
+          <a:bodyPr lIns="45718" tIns="45718" rIns="45718" bIns="45718">
             <a:normAutofit fontScale="100000" lnSpcReduction="0"/>
           </a:bodyPr>
           <a:lstStyle/>
@@ -1953,8 +1937,8 @@
         </p:nvSpPr>
         <p:spPr>
           <a:xfrm>
-            <a:off x="8428176" y="6414760"/>
-            <a:ext cx="258624" cy="248305"/>
+            <a:off x="8428178" y="6414761"/>
+            <a:ext cx="258623" cy="248303"/>
           </a:xfrm>
           <a:prstGeom prst="rect">
             <a:avLst/>
@@ -1964,7 +1948,7 @@
           </a:ln>
         </p:spPr>
         <p:txBody>
-          <a:bodyPr wrap="none" lIns="45719" rIns="45719" anchor="ctr">
+          <a:bodyPr wrap="none" lIns="45718" tIns="45718" rIns="45718" bIns="45718" anchor="ctr">
             <a:spAutoFit/>
           </a:bodyPr>
           <a:lstStyle>
@@ -1973,6 +1957,10 @@
                 <a:solidFill>
                   <a:srgbClr val="888888"/>
                 </a:solidFill>
+                <a:latin typeface="+mj-lt"/>
+                <a:ea typeface="+mj-ea"/>
+                <a:cs typeface="+mj-cs"/>
+                <a:sym typeface="Calibri"/>
               </a:defRPr>
             </a:lvl1pPr>
           </a:lstStyle>
@@ -2497,7 +2485,7 @@
           <a:sym typeface="Calibri"/>
         </a:defRPr>
       </a:lvl1pPr>
-      <a:lvl2pPr marL="0" marR="0" indent="457200" algn="r" defTabSz="457200" rtl="0" latinLnBrk="0">
+      <a:lvl2pPr marL="0" marR="0" indent="0" algn="r" defTabSz="457200" rtl="0" latinLnBrk="0">
         <a:lnSpc>
           <a:spcPct val="100000"/>
         </a:lnSpc>
@@ -2523,7 +2511,7 @@
           <a:sym typeface="Calibri"/>
         </a:defRPr>
       </a:lvl2pPr>
-      <a:lvl3pPr marL="0" marR="0" indent="914400" algn="r" defTabSz="457200" rtl="0" latinLnBrk="0">
+      <a:lvl3pPr marL="0" marR="0" indent="0" algn="r" defTabSz="457200" rtl="0" latinLnBrk="0">
         <a:lnSpc>
           <a:spcPct val="100000"/>
         </a:lnSpc>
@@ -2549,7 +2537,7 @@
           <a:sym typeface="Calibri"/>
         </a:defRPr>
       </a:lvl3pPr>
-      <a:lvl4pPr marL="0" marR="0" indent="1371600" algn="r" defTabSz="457200" rtl="0" latinLnBrk="0">
+      <a:lvl4pPr marL="0" marR="0" indent="0" algn="r" defTabSz="457200" rtl="0" latinLnBrk="0">
         <a:lnSpc>
           <a:spcPct val="100000"/>
         </a:lnSpc>
@@ -2575,7 +2563,7 @@
           <a:sym typeface="Calibri"/>
         </a:defRPr>
       </a:lvl4pPr>
-      <a:lvl5pPr marL="0" marR="0" indent="1828800" algn="r" defTabSz="457200" rtl="0" latinLnBrk="0">
+      <a:lvl5pPr marL="0" marR="0" indent="0" algn="r" defTabSz="457200" rtl="0" latinLnBrk="0">
         <a:lnSpc>
           <a:spcPct val="100000"/>
         </a:lnSpc>
@@ -2601,7 +2589,7 @@
           <a:sym typeface="Calibri"/>
         </a:defRPr>
       </a:lvl5pPr>
-      <a:lvl6pPr marL="0" marR="0" indent="2286000" algn="r" defTabSz="457200" rtl="0" latinLnBrk="0">
+      <a:lvl6pPr marL="0" marR="0" indent="0" algn="r" defTabSz="457200" rtl="0" latinLnBrk="0">
         <a:lnSpc>
           <a:spcPct val="100000"/>
         </a:lnSpc>
@@ -2627,7 +2615,7 @@
           <a:sym typeface="Calibri"/>
         </a:defRPr>
       </a:lvl6pPr>
-      <a:lvl7pPr marL="0" marR="0" indent="2743200" algn="r" defTabSz="457200" rtl="0" latinLnBrk="0">
+      <a:lvl7pPr marL="0" marR="0" indent="0" algn="r" defTabSz="457200" rtl="0" latinLnBrk="0">
         <a:lnSpc>
           <a:spcPct val="100000"/>
         </a:lnSpc>
@@ -2653,7 +2641,7 @@
           <a:sym typeface="Calibri"/>
         </a:defRPr>
       </a:lvl7pPr>
-      <a:lvl8pPr marL="0" marR="0" indent="3200400" algn="r" defTabSz="457200" rtl="0" latinLnBrk="0">
+      <a:lvl8pPr marL="0" marR="0" indent="0" algn="r" defTabSz="457200" rtl="0" latinLnBrk="0">
         <a:lnSpc>
           <a:spcPct val="100000"/>
         </a:lnSpc>
@@ -2679,7 +2667,7 @@
           <a:sym typeface="Calibri"/>
         </a:defRPr>
       </a:lvl8pPr>
-      <a:lvl9pPr marL="0" marR="0" indent="3657600" algn="r" defTabSz="457200" rtl="0" latinLnBrk="0">
+      <a:lvl9pPr marL="0" marR="0" indent="0" algn="r" defTabSz="457200" rtl="0" latinLnBrk="0">
         <a:lnSpc>
           <a:spcPct val="100000"/>
         </a:lnSpc>
@@ -2753,21 +2741,8 @@
             </a:lvl1pPr>
           </a:lstStyle>
           <a:p>
-            <a:pPr>
-              <a:defRPr>
-                <a:latin typeface="+mj-lt"/>
-                <a:ea typeface="+mj-ea"/>
-                <a:cs typeface="+mj-cs"/>
-                <a:sym typeface="Calibri"/>
-              </a:defRPr>
-            </a:pPr>
-            <a:r>
-              <a:rPr>
-                <a:latin typeface="+mn-lt"/>
-                <a:ea typeface="+mn-ea"/>
-                <a:cs typeface="+mn-cs"/>
-                <a:sym typeface="Helvetica"/>
-              </a:rPr>
+            <a:pPr/>
+            <a:r>
               <a:t>课程项目提交与答辩管理系统</a:t>
             </a:r>
           </a:p>
@@ -2794,120 +2769,98 @@
               <a:spcBef>
                 <a:spcPts val="400"/>
               </a:spcBef>
-              <a:defRPr sz="2016"/>
-            </a:pPr>
-            <a:r>
-              <a:rPr>
+              <a:defRPr sz="2000">
                 <a:latin typeface="+mn-lt"/>
                 <a:ea typeface="+mn-ea"/>
                 <a:cs typeface="+mn-cs"/>
                 <a:sym typeface="Helvetica"/>
+              </a:defRPr>
+            </a:pPr>
+            <a:r>
+              <a:t>上海大学理学院 </a:t>
+            </a:r>
+            <a:r>
+              <a:rPr>
+                <a:latin typeface="+mj-lt"/>
+                <a:ea typeface="+mj-ea"/>
+                <a:cs typeface="+mj-cs"/>
+                <a:sym typeface="Calibri"/>
               </a:rPr>
-              <a:t>上海大学理学院 </a:t>
-            </a:r>
-            <a:r>
               <a:t>· </a:t>
             </a:r>
             <a:r>
-              <a:rPr>
+              <a:t>数学与应用数学</a:t>
+            </a:r>
+          </a:p>
+          <a:p>
+            <a:pPr defTabSz="288036">
+              <a:spcBef>
+                <a:spcPts val="400"/>
+              </a:spcBef>
+              <a:defRPr sz="2000">
                 <a:latin typeface="+mn-lt"/>
                 <a:ea typeface="+mn-ea"/>
                 <a:cs typeface="+mn-cs"/>
                 <a:sym typeface="Helvetica"/>
-              </a:rPr>
-              <a:t>数学与应用数学</a:t>
-            </a:r>
-            <a:endParaRPr>
-              <a:latin typeface="+mn-lt"/>
-              <a:ea typeface="+mn-ea"/>
-              <a:cs typeface="+mn-cs"/>
-              <a:sym typeface="Helvetica"/>
-            </a:endParaRPr>
+              </a:defRPr>
+            </a:pPr>
+            <a:r>
+              <a:t>组员：潘上、邬茗</a:t>
+            </a:r>
           </a:p>
           <a:p>
             <a:pPr defTabSz="288036">
               <a:spcBef>
                 <a:spcPts val="400"/>
               </a:spcBef>
-              <a:defRPr sz="2016"/>
-            </a:pPr>
-            <a:r>
-              <a:rPr>
+              <a:defRPr sz="2000">
                 <a:latin typeface="+mn-lt"/>
                 <a:ea typeface="+mn-ea"/>
                 <a:cs typeface="+mn-cs"/>
                 <a:sym typeface="Helvetica"/>
-              </a:rPr>
-              <a:t>组员：潘上、邬茗</a:t>
-            </a:r>
-            <a:endParaRPr>
-              <a:latin typeface="+mn-lt"/>
-              <a:ea typeface="+mn-ea"/>
-              <a:cs typeface="+mn-cs"/>
-              <a:sym typeface="Helvetica"/>
-            </a:endParaRPr>
+              </a:defRPr>
+            </a:pPr>
+            <a:r>
+              <a:t>课程：数据库设计与开发</a:t>
+            </a:r>
           </a:p>
           <a:p>
             <a:pPr defTabSz="288036">
               <a:spcBef>
                 <a:spcPts val="400"/>
               </a:spcBef>
-              <a:defRPr sz="2016"/>
-            </a:pPr>
-            <a:r>
-              <a:rPr>
+              <a:defRPr sz="2000">
                 <a:latin typeface="+mn-lt"/>
                 <a:ea typeface="+mn-ea"/>
                 <a:cs typeface="+mn-cs"/>
                 <a:sym typeface="Helvetica"/>
+              </a:defRPr>
+            </a:pPr>
+            <a:r>
+              <a:t>日期：</a:t>
+            </a:r>
+            <a:r>
+              <a:rPr>
+                <a:latin typeface="+mj-lt"/>
+                <a:ea typeface="+mj-ea"/>
+                <a:cs typeface="+mj-cs"/>
+                <a:sym typeface="Calibri"/>
               </a:rPr>
-              <a:t>课程：数据库设计与开发</a:t>
-            </a:r>
-            <a:endParaRPr>
-              <a:latin typeface="+mn-lt"/>
-              <a:ea typeface="+mn-ea"/>
-              <a:cs typeface="+mn-cs"/>
-              <a:sym typeface="Helvetica"/>
-            </a:endParaRPr>
-          </a:p>
-          <a:p>
-            <a:pPr defTabSz="288036">
-              <a:spcBef>
-                <a:spcPts val="400"/>
-              </a:spcBef>
-              <a:defRPr sz="2016"/>
-            </a:pPr>
+              <a:t>2025</a:t>
+            </a:r>
+            <a:r>
+              <a:t>年</a:t>
+            </a:r>
             <a:r>
               <a:rPr>
-                <a:latin typeface="+mn-lt"/>
-                <a:ea typeface="+mn-ea"/>
-                <a:cs typeface="+mn-cs"/>
-                <a:sym typeface="Helvetica"/>
+                <a:latin typeface="+mj-lt"/>
+                <a:ea typeface="+mj-ea"/>
+                <a:cs typeface="+mj-cs"/>
+                <a:sym typeface="Calibri"/>
               </a:rPr>
-              <a:t>日期：</a:t>
-            </a:r>
-            <a:r>
-              <a:t>2025</a:t>
-            </a:r>
-            <a:r>
-              <a:rPr>
-                <a:latin typeface="+mn-lt"/>
-                <a:ea typeface="+mn-ea"/>
-                <a:cs typeface="+mn-cs"/>
-                <a:sym typeface="Helvetica"/>
-              </a:rPr>
-              <a:t>年</a:t>
-            </a:r>
-            <a:r>
               <a:t>7</a:t>
             </a:r>
             <a:r>
-              <a:rPr>
-                <a:latin typeface="+mn-lt"/>
-                <a:ea typeface="+mn-ea"/>
-                <a:cs typeface="+mn-cs"/>
-                <a:sym typeface="Helvetica"/>
-              </a:rPr>
               <a:t>月</a:t>
             </a:r>
           </a:p>
@@ -2941,13 +2894,17 @@
       </p:grpSpPr>
       <p:sp>
         <p:nvSpPr>
-          <p:cNvPr id="121" name="Title 1"/>
+          <p:cNvPr id="122" name="Title 1"/>
           <p:cNvSpPr txBox="1"/>
           <p:nvPr>
             <p:ph type="title"/>
           </p:nvPr>
         </p:nvSpPr>
         <p:spPr>
+          <a:xfrm>
+            <a:off x="457200" y="274638"/>
+            <a:ext cx="8229600" cy="1143001"/>
+          </a:xfrm>
           <a:prstGeom prst="rect">
             <a:avLst/>
           </a:prstGeom>
@@ -2974,7 +2931,7 @@
       </p:sp>
       <p:sp>
         <p:nvSpPr>
-          <p:cNvPr id="122" name="Content Placeholder 2"/>
+          <p:cNvPr id="123" name="Content Placeholder 2"/>
           <p:cNvSpPr txBox="1"/>
           <p:nvPr>
             <p:ph type="body" idx="1"/>
@@ -3026,44 +2983,40 @@
             </a:endParaRPr>
           </a:p>
           <a:p>
-            <a:pPr/>
-            <a:r>
-              <a:rPr>
+            <a:pPr>
+              <a:defRPr>
                 <a:latin typeface="+mn-lt"/>
                 <a:ea typeface="+mn-ea"/>
                 <a:cs typeface="+mn-cs"/>
                 <a:sym typeface="Helvetica"/>
-              </a:rPr>
+              </a:defRPr>
+            </a:pPr>
+            <a:r>
               <a:t>幂等机制避免重复写入。</a:t>
             </a:r>
-            <a:endParaRPr>
-              <a:latin typeface="+mn-lt"/>
-              <a:ea typeface="+mn-ea"/>
-              <a:cs typeface="+mn-cs"/>
-              <a:sym typeface="Helvetica"/>
-            </a:endParaRPr>
-          </a:p>
-          <a:p>
-            <a:pPr/>
-            <a:r>
-              <a:rPr>
+          </a:p>
+          <a:p>
+            <a:pPr>
+              <a:defRPr>
                 <a:latin typeface="+mn-lt"/>
                 <a:ea typeface="+mn-ea"/>
                 <a:cs typeface="+mn-cs"/>
                 <a:sym typeface="Helvetica"/>
+              </a:defRPr>
+            </a:pPr>
+            <a:r>
+              <a:t>安全策略：</a:t>
+            </a:r>
+            <a:r>
+              <a:rPr>
+                <a:latin typeface="+mj-lt"/>
+                <a:ea typeface="+mj-ea"/>
+                <a:cs typeface="+mj-cs"/>
+                <a:sym typeface="Calibri"/>
               </a:rPr>
-              <a:t>安全策略：</a:t>
-            </a:r>
-            <a:r>
               <a:t>HttpOnly Cookie</a:t>
             </a:r>
             <a:r>
-              <a:rPr>
-                <a:latin typeface="+mn-lt"/>
-                <a:ea typeface="+mn-ea"/>
-                <a:cs typeface="+mn-cs"/>
-                <a:sym typeface="Helvetica"/>
-              </a:rPr>
               <a:t>、最小输入校验、明确的清理路径。</a:t>
             </a:r>
           </a:p>
@@ -3097,13 +3050,17 @@
       </p:grpSpPr>
       <p:sp>
         <p:nvSpPr>
-          <p:cNvPr id="124" name="Title 1"/>
+          <p:cNvPr id="125" name="Title 1"/>
           <p:cNvSpPr txBox="1"/>
           <p:nvPr>
             <p:ph type="title"/>
           </p:nvPr>
         </p:nvSpPr>
         <p:spPr>
+          <a:xfrm>
+            <a:off x="457200" y="274638"/>
+            <a:ext cx="8229600" cy="1143001"/>
+          </a:xfrm>
           <a:prstGeom prst="rect">
             <a:avLst/>
           </a:prstGeom>
@@ -3130,7 +3087,7 @@
       </p:sp>
       <p:sp>
         <p:nvSpPr>
-          <p:cNvPr id="125" name="Content Placeholder 2"/>
+          <p:cNvPr id="126" name="Content Placeholder 2"/>
           <p:cNvSpPr txBox="1"/>
           <p:nvPr>
             <p:ph type="body" idx="1"/>
@@ -3149,44 +3106,40 @@
           <a:bodyPr/>
           <a:lstStyle/>
           <a:p>
-            <a:pPr/>
-            <a:r>
-              <a:rPr>
+            <a:pPr>
+              <a:defRPr>
                 <a:latin typeface="+mn-lt"/>
                 <a:ea typeface="+mn-ea"/>
                 <a:cs typeface="+mn-cs"/>
                 <a:sym typeface="Helvetica"/>
-              </a:rPr>
+              </a:defRPr>
+            </a:pPr>
+            <a:r>
               <a:t>已实现：论文提交与答辩管理闭环。</a:t>
             </a:r>
-            <a:endParaRPr>
-              <a:latin typeface="+mn-lt"/>
-              <a:ea typeface="+mn-ea"/>
-              <a:cs typeface="+mn-cs"/>
-              <a:sym typeface="Helvetica"/>
-            </a:endParaRPr>
-          </a:p>
-          <a:p>
-            <a:pPr/>
-            <a:r>
-              <a:rPr>
+          </a:p>
+          <a:p>
+            <a:pPr>
+              <a:defRPr>
                 <a:latin typeface="+mn-lt"/>
                 <a:ea typeface="+mn-ea"/>
                 <a:cs typeface="+mn-cs"/>
                 <a:sym typeface="Helvetica"/>
+              </a:defRPr>
+            </a:pPr>
+            <a:r>
+              <a:t>未来方向：</a:t>
+            </a:r>
+            <a:r>
+              <a:rPr>
+                <a:latin typeface="+mj-lt"/>
+                <a:ea typeface="+mj-ea"/>
+                <a:cs typeface="+mj-cs"/>
+                <a:sym typeface="Calibri"/>
               </a:rPr>
-              <a:t>未来方向：</a:t>
-            </a:r>
-            <a:r>
               <a:t>Redis</a:t>
             </a:r>
             <a:r>
-              <a:rPr>
-                <a:latin typeface="+mn-lt"/>
-                <a:ea typeface="+mn-ea"/>
-                <a:cs typeface="+mn-cs"/>
-                <a:sym typeface="Helvetica"/>
-              </a:rPr>
               <a:t>会话、文件上传、通知系统、学术检测、导入导出功能。</a:t>
             </a:r>
           </a:p>
@@ -3227,6 +3180,10 @@
           </p:nvPr>
         </p:nvSpPr>
         <p:spPr>
+          <a:xfrm>
+            <a:off x="457200" y="274638"/>
+            <a:ext cx="8229600" cy="1143001"/>
+          </a:xfrm>
           <a:prstGeom prst="rect">
             <a:avLst/>
           </a:prstGeom>
@@ -3272,32 +3229,28 @@
           <a:bodyPr/>
           <a:lstStyle/>
           <a:p>
-            <a:pPr/>
-            <a:r>
-              <a:rPr>
+            <a:pPr>
+              <a:defRPr>
                 <a:latin typeface="+mn-lt"/>
                 <a:ea typeface="+mn-ea"/>
                 <a:cs typeface="+mn-cs"/>
                 <a:sym typeface="Helvetica"/>
-              </a:rPr>
+              </a:defRPr>
+            </a:pPr>
+            <a:r>
               <a:t>传统论文管理流程存在材料分散、沟通繁琐等问题。</a:t>
             </a:r>
-            <a:endParaRPr>
-              <a:latin typeface="+mn-lt"/>
-              <a:ea typeface="+mn-ea"/>
-              <a:cs typeface="+mn-cs"/>
-              <a:sym typeface="Helvetica"/>
-            </a:endParaRPr>
-          </a:p>
-          <a:p>
-            <a:pPr/>
-            <a:r>
-              <a:rPr>
+          </a:p>
+          <a:p>
+            <a:pPr>
+              <a:defRPr>
                 <a:latin typeface="+mn-lt"/>
                 <a:ea typeface="+mn-ea"/>
                 <a:cs typeface="+mn-cs"/>
                 <a:sym typeface="Helvetica"/>
-              </a:rPr>
+              </a:defRPr>
+            </a:pPr>
+            <a:r>
               <a:t>本项目构建统一在线平台，实现学生提交、教师评分、管理员统筹的全流程管理。</a:t>
             </a:r>
           </a:p>
@@ -3338,6 +3291,10 @@
           </p:nvPr>
         </p:nvSpPr>
         <p:spPr>
+          <a:xfrm>
+            <a:off x="457200" y="274638"/>
+            <a:ext cx="8229600" cy="1143001"/>
+          </a:xfrm>
           <a:prstGeom prst="rect">
             <a:avLst/>
           </a:prstGeom>
@@ -3383,95 +3340,104 @@
           <a:bodyPr/>
           <a:lstStyle/>
           <a:p>
-            <a:pPr/>
-            <a:r>
-              <a:rPr>
+            <a:pPr>
+              <a:defRPr>
                 <a:latin typeface="+mn-lt"/>
                 <a:ea typeface="+mn-ea"/>
                 <a:cs typeface="+mn-cs"/>
                 <a:sym typeface="Helvetica"/>
-              </a:rPr>
+              </a:defRPr>
+            </a:pPr>
+            <a:r>
               <a:t>核心原则：轻量、易部署、可复现。</a:t>
             </a:r>
-            <a:endParaRPr>
-              <a:latin typeface="+mn-lt"/>
-              <a:ea typeface="+mn-ea"/>
-              <a:cs typeface="+mn-cs"/>
-              <a:sym typeface="Helvetica"/>
-            </a:endParaRPr>
-          </a:p>
-          <a:p>
-            <a:pPr/>
-            <a:r>
-              <a:rPr>
+          </a:p>
+          <a:p>
+            <a:pPr>
+              <a:defRPr>
                 <a:latin typeface="+mn-lt"/>
                 <a:ea typeface="+mn-ea"/>
                 <a:cs typeface="+mn-cs"/>
                 <a:sym typeface="Helvetica"/>
+              </a:defRPr>
+            </a:pPr>
+            <a:r>
+              <a:t>架构：前端</a:t>
+            </a:r>
+            <a:r>
+              <a:rPr>
+                <a:latin typeface="+mj-lt"/>
+                <a:ea typeface="+mj-ea"/>
+                <a:cs typeface="+mj-cs"/>
+                <a:sym typeface="Calibri"/>
               </a:rPr>
-              <a:t>架构：前端</a:t>
-            </a:r>
-            <a:r>
               <a:t>(HTML+TailwindCSS) → </a:t>
             </a:r>
             <a:r>
+              <a:t>后端</a:t>
+            </a:r>
+            <a:r>
               <a:rPr>
+                <a:latin typeface="+mj-lt"/>
+                <a:ea typeface="+mj-ea"/>
+                <a:cs typeface="+mj-cs"/>
+                <a:sym typeface="Calibri"/>
+              </a:rPr>
+              <a:t>(Bun+Elysia.js) → </a:t>
+            </a:r>
+            <a:r>
+              <a:t>数据库</a:t>
+            </a:r>
+            <a:r>
+              <a:rPr>
+                <a:latin typeface="+mj-lt"/>
+                <a:ea typeface="+mj-ea"/>
+                <a:cs typeface="+mj-cs"/>
+                <a:sym typeface="Calibri"/>
+              </a:rPr>
+              <a:t>(SQLite)</a:t>
+            </a:r>
+            <a:endParaRPr>
+              <a:latin typeface="+mj-lt"/>
+              <a:ea typeface="+mj-ea"/>
+              <a:cs typeface="+mj-cs"/>
+              <a:sym typeface="Calibri"/>
+            </a:endParaRPr>
+          </a:p>
+          <a:p>
+            <a:pPr>
+              <a:defRPr>
                 <a:latin typeface="+mn-lt"/>
                 <a:ea typeface="+mn-ea"/>
                 <a:cs typeface="+mn-cs"/>
                 <a:sym typeface="Helvetica"/>
+              </a:defRPr>
+            </a:pPr>
+            <a:r>
+              <a:t>单进程</a:t>
+            </a:r>
+            <a:r>
+              <a:rPr>
+                <a:latin typeface="+mj-lt"/>
+                <a:ea typeface="+mj-ea"/>
+                <a:cs typeface="+mj-cs"/>
+                <a:sym typeface="Calibri"/>
               </a:rPr>
-              <a:t>后端</a:t>
-            </a:r>
-            <a:r>
-              <a:t>(Bun+Elysia.js) → </a:t>
+              <a:t>Bun</a:t>
+            </a:r>
+            <a:r>
+              <a:t>服务提供静态资源与</a:t>
             </a:r>
             <a:r>
               <a:rPr>
-                <a:latin typeface="+mn-lt"/>
-                <a:ea typeface="+mn-ea"/>
-                <a:cs typeface="+mn-cs"/>
-                <a:sym typeface="Helvetica"/>
+                <a:latin typeface="+mj-lt"/>
+                <a:ea typeface="+mj-ea"/>
+                <a:cs typeface="+mj-cs"/>
+                <a:sym typeface="Calibri"/>
               </a:rPr>
-              <a:t>数据库</a:t>
-            </a:r>
-            <a:r>
-              <a:t>(SQLite)</a:t>
-            </a:r>
-          </a:p>
-          <a:p>
-            <a:pPr/>
-            <a:r>
-              <a:rPr>
-                <a:latin typeface="+mn-lt"/>
-                <a:ea typeface="+mn-ea"/>
-                <a:cs typeface="+mn-cs"/>
-                <a:sym typeface="Helvetica"/>
-              </a:rPr>
-              <a:t>单进程</a:t>
-            </a:r>
-            <a:r>
-              <a:t>Bun</a:t>
-            </a:r>
-            <a:r>
-              <a:rPr>
-                <a:latin typeface="+mn-lt"/>
-                <a:ea typeface="+mn-ea"/>
-                <a:cs typeface="+mn-cs"/>
-                <a:sym typeface="Helvetica"/>
-              </a:rPr>
-              <a:t>服务提供静态资源与</a:t>
-            </a:r>
-            <a:r>
               <a:t>REST API</a:t>
             </a:r>
             <a:r>
-              <a:rPr>
-                <a:latin typeface="+mn-lt"/>
-                <a:ea typeface="+mn-ea"/>
-                <a:cs typeface="+mn-cs"/>
-                <a:sym typeface="Helvetica"/>
-              </a:rPr>
               <a:t>。</a:t>
             </a:r>
           </a:p>
@@ -3512,6 +3478,10 @@
           </p:nvPr>
         </p:nvSpPr>
         <p:spPr>
+          <a:xfrm>
+            <a:off x="457200" y="274638"/>
+            <a:ext cx="8229600" cy="1143001"/>
+          </a:xfrm>
           <a:prstGeom prst="rect">
             <a:avLst/>
           </a:prstGeom>
@@ -3557,116 +3527,126 @@
           <a:bodyPr/>
           <a:lstStyle/>
           <a:p>
-            <a:pPr/>
-            <a:r>
-              <a:rPr>
+            <a:pPr>
+              <a:defRPr>
                 <a:latin typeface="+mn-lt"/>
                 <a:ea typeface="+mn-ea"/>
                 <a:cs typeface="+mn-cs"/>
                 <a:sym typeface="Helvetica"/>
+              </a:defRPr>
+            </a:pPr>
+            <a:r>
+              <a:t>后端：</a:t>
+            </a:r>
+            <a:r>
+              <a:rPr>
+                <a:latin typeface="+mj-lt"/>
+                <a:ea typeface="+mj-ea"/>
+                <a:cs typeface="+mj-cs"/>
+                <a:sym typeface="Calibri"/>
               </a:rPr>
-              <a:t>后端：</a:t>
-            </a:r>
-            <a:r>
               <a:t>Bun + Elysia.js</a:t>
             </a:r>
             <a:r>
-              <a:rPr>
+              <a:t>（高性能、类型安全）</a:t>
+            </a:r>
+          </a:p>
+          <a:p>
+            <a:pPr>
+              <a:defRPr>
                 <a:latin typeface="+mn-lt"/>
                 <a:ea typeface="+mn-ea"/>
                 <a:cs typeface="+mn-cs"/>
                 <a:sym typeface="Helvetica"/>
+              </a:defRPr>
+            </a:pPr>
+            <a:r>
+              <a:t>数据库：</a:t>
+            </a:r>
+            <a:r>
+              <a:rPr>
+                <a:latin typeface="+mj-lt"/>
+                <a:ea typeface="+mj-ea"/>
+                <a:cs typeface="+mj-cs"/>
+                <a:sym typeface="Calibri"/>
               </a:rPr>
-              <a:t>（高性能、类型安全）</a:t>
-            </a:r>
-            <a:endParaRPr>
-              <a:latin typeface="+mn-lt"/>
-              <a:ea typeface="+mn-ea"/>
-              <a:cs typeface="+mn-cs"/>
-              <a:sym typeface="Helvetica"/>
-            </a:endParaRPr>
-          </a:p>
-          <a:p>
-            <a:pPr/>
-            <a:r>
-              <a:rPr>
+              <a:t>SQLite</a:t>
+            </a:r>
+            <a:r>
+              <a:t>（零配置、支持外键）</a:t>
+            </a:r>
+          </a:p>
+          <a:p>
+            <a:pPr>
+              <a:defRPr>
                 <a:latin typeface="+mn-lt"/>
                 <a:ea typeface="+mn-ea"/>
                 <a:cs typeface="+mn-cs"/>
                 <a:sym typeface="Helvetica"/>
+              </a:defRPr>
+            </a:pPr>
+            <a:r>
+              <a:t>前端：</a:t>
+            </a:r>
+            <a:r>
+              <a:rPr>
+                <a:latin typeface="+mj-lt"/>
+                <a:ea typeface="+mj-ea"/>
+                <a:cs typeface="+mj-cs"/>
+                <a:sym typeface="Calibri"/>
               </a:rPr>
-              <a:t>数据库：</a:t>
-            </a:r>
-            <a:r>
-              <a:t>SQLite</a:t>
+              <a:t>HTML + TailwindCSS + </a:t>
+            </a:r>
+            <a:r>
+              <a:t>原生</a:t>
             </a:r>
             <a:r>
               <a:rPr>
+                <a:latin typeface="+mj-lt"/>
+                <a:ea typeface="+mj-ea"/>
+                <a:cs typeface="+mj-cs"/>
+                <a:sym typeface="Calibri"/>
+              </a:rPr>
+              <a:t>JS</a:t>
+            </a:r>
+            <a:endParaRPr>
+              <a:latin typeface="+mj-lt"/>
+              <a:ea typeface="+mj-ea"/>
+              <a:cs typeface="+mj-cs"/>
+              <a:sym typeface="Calibri"/>
+            </a:endParaRPr>
+          </a:p>
+          <a:p>
+            <a:pPr>
+              <a:defRPr>
                 <a:latin typeface="+mn-lt"/>
                 <a:ea typeface="+mn-ea"/>
                 <a:cs typeface="+mn-cs"/>
                 <a:sym typeface="Helvetica"/>
+              </a:defRPr>
+            </a:pPr>
+            <a:r>
+              <a:t>会话：</a:t>
+            </a:r>
+            <a:r>
+              <a:rPr>
+                <a:latin typeface="+mj-lt"/>
+                <a:ea typeface="+mj-ea"/>
+                <a:cs typeface="+mj-cs"/>
+                <a:sym typeface="Calibri"/>
               </a:rPr>
-              <a:t>（零配置、支持外键）</a:t>
-            </a:r>
-            <a:endParaRPr>
-              <a:latin typeface="+mn-lt"/>
-              <a:ea typeface="+mn-ea"/>
-              <a:cs typeface="+mn-cs"/>
-              <a:sym typeface="Helvetica"/>
-            </a:endParaRPr>
-          </a:p>
-          <a:p>
-            <a:pPr/>
+              <a:t>HttpOnly Cookie + </a:t>
+            </a:r>
+            <a:r>
+              <a:t>内存</a:t>
+            </a:r>
             <a:r>
               <a:rPr>
-                <a:latin typeface="+mn-lt"/>
-                <a:ea typeface="+mn-ea"/>
-                <a:cs typeface="+mn-cs"/>
-                <a:sym typeface="Helvetica"/>
+                <a:latin typeface="+mj-lt"/>
+                <a:ea typeface="+mj-ea"/>
+                <a:cs typeface="+mj-cs"/>
+                <a:sym typeface="Calibri"/>
               </a:rPr>
-              <a:t>前端：</a:t>
-            </a:r>
-            <a:r>
-              <a:t>HTML + TailwindCSS + </a:t>
-            </a:r>
-            <a:r>
-              <a:rPr>
-                <a:latin typeface="+mn-lt"/>
-                <a:ea typeface="+mn-ea"/>
-                <a:cs typeface="+mn-cs"/>
-                <a:sym typeface="Helvetica"/>
-              </a:rPr>
-              <a:t>原生</a:t>
-            </a:r>
-            <a:r>
-              <a:t>JS</a:t>
-            </a:r>
-          </a:p>
-          <a:p>
-            <a:pPr/>
-            <a:r>
-              <a:rPr>
-                <a:latin typeface="+mn-lt"/>
-                <a:ea typeface="+mn-ea"/>
-                <a:cs typeface="+mn-cs"/>
-                <a:sym typeface="Helvetica"/>
-              </a:rPr>
-              <a:t>会话：</a:t>
-            </a:r>
-            <a:r>
-              <a:t>HttpOnly Cookie + </a:t>
-            </a:r>
-            <a:r>
-              <a:rPr>
-                <a:latin typeface="+mn-lt"/>
-                <a:ea typeface="+mn-ea"/>
-                <a:cs typeface="+mn-cs"/>
-                <a:sym typeface="Helvetica"/>
-              </a:rPr>
-              <a:t>内存</a:t>
-            </a:r>
-            <a:r>
               <a:t>Map</a:t>
             </a:r>
           </a:p>
@@ -3707,6 +3687,10 @@
           </p:nvPr>
         </p:nvSpPr>
         <p:spPr>
+          <a:xfrm>
+            <a:off x="457200" y="274638"/>
+            <a:ext cx="8229600" cy="1143001"/>
+          </a:xfrm>
           <a:prstGeom prst="rect">
             <a:avLst/>
           </a:prstGeom>
@@ -3752,44 +3736,40 @@
           <a:bodyPr/>
           <a:lstStyle/>
           <a:p>
-            <a:pPr/>
-            <a:r>
-              <a:rPr>
+            <a:pPr>
+              <a:defRPr>
                 <a:latin typeface="+mn-lt"/>
                 <a:ea typeface="+mn-ea"/>
                 <a:cs typeface="+mn-cs"/>
                 <a:sym typeface="Helvetica"/>
-              </a:rPr>
+              </a:defRPr>
+            </a:pPr>
+            <a:r>
               <a:t>三类角色：学生、教师、管理员。</a:t>
             </a:r>
-            <a:endParaRPr>
-              <a:latin typeface="+mn-lt"/>
-              <a:ea typeface="+mn-ea"/>
-              <a:cs typeface="+mn-cs"/>
-              <a:sym typeface="Helvetica"/>
-            </a:endParaRPr>
-          </a:p>
-          <a:p>
-            <a:pPr/>
-            <a:r>
-              <a:rPr>
+          </a:p>
+          <a:p>
+            <a:pPr>
+              <a:defRPr>
                 <a:latin typeface="+mn-lt"/>
                 <a:ea typeface="+mn-ea"/>
                 <a:cs typeface="+mn-cs"/>
                 <a:sym typeface="Helvetica"/>
+              </a:defRPr>
+            </a:pPr>
+            <a:r>
+              <a:t>核心需求：角色认证、唯一论文约束、教师</a:t>
+            </a:r>
+            <a:r>
+              <a:rPr>
+                <a:latin typeface="+mj-lt"/>
+                <a:ea typeface="+mj-ea"/>
+                <a:cs typeface="+mj-cs"/>
+                <a:sym typeface="Calibri"/>
               </a:rPr>
-              <a:t>核心需求：角色认证、唯一论文约束、教师</a:t>
-            </a:r>
-            <a:r>
               <a:t>-</a:t>
             </a:r>
             <a:r>
-              <a:rPr>
-                <a:latin typeface="+mn-lt"/>
-                <a:ea typeface="+mn-ea"/>
-                <a:cs typeface="+mn-cs"/>
-                <a:sym typeface="Helvetica"/>
-              </a:rPr>
               <a:t>时段多对多、评分唯一性、幂等写入。</a:t>
             </a:r>
           </a:p>
@@ -3830,6 +3810,10 @@
           </p:nvPr>
         </p:nvSpPr>
         <p:spPr>
+          <a:xfrm>
+            <a:off x="457200" y="274638"/>
+            <a:ext cx="8229600" cy="1143001"/>
+          </a:xfrm>
           <a:prstGeom prst="rect">
             <a:avLst/>
           </a:prstGeom>
@@ -3875,121 +3859,109 @@
           <a:bodyPr/>
           <a:lstStyle/>
           <a:p>
-            <a:pPr/>
-            <a:r>
-              <a:rPr>
+            <a:pPr>
+              <a:defRPr>
                 <a:latin typeface="+mn-lt"/>
                 <a:ea typeface="+mn-ea"/>
                 <a:cs typeface="+mn-cs"/>
                 <a:sym typeface="Helvetica"/>
+              </a:defRPr>
+            </a:pPr>
+            <a:r>
+              <a:t>五张核心表：</a:t>
+            </a:r>
+            <a:r>
+              <a:rPr>
+                <a:latin typeface="+mj-lt"/>
+                <a:ea typeface="+mj-ea"/>
+                <a:cs typeface="+mj-cs"/>
+                <a:sym typeface="Calibri"/>
               </a:rPr>
-              <a:t>五张核心表：</a:t>
-            </a:r>
-            <a:r>
               <a:t>users</a:t>
             </a:r>
             <a:r>
+              <a:t>、</a:t>
+            </a:r>
+            <a:r>
               <a:rPr>
-                <a:latin typeface="+mn-lt"/>
-                <a:ea typeface="+mn-ea"/>
-                <a:cs typeface="+mn-cs"/>
-                <a:sym typeface="Helvetica"/>
+                <a:latin typeface="+mj-lt"/>
+                <a:ea typeface="+mj-ea"/>
+                <a:cs typeface="+mj-cs"/>
+                <a:sym typeface="Calibri"/>
               </a:rPr>
+              <a:t>defense_slots</a:t>
+            </a:r>
+            <a:r>
               <a:t>、</a:t>
             </a:r>
             <a:r>
-              <a:t>defense_slots</a:t>
-            </a:r>
-            <a:r>
               <a:rPr>
-                <a:latin typeface="+mn-lt"/>
-                <a:ea typeface="+mn-ea"/>
-                <a:cs typeface="+mn-cs"/>
-                <a:sym typeface="Helvetica"/>
+                <a:latin typeface="+mj-lt"/>
+                <a:ea typeface="+mj-ea"/>
+                <a:cs typeface="+mj-cs"/>
+                <a:sym typeface="Calibri"/>
               </a:rPr>
+              <a:t>projects</a:t>
+            </a:r>
+            <a:r>
               <a:t>、</a:t>
             </a:r>
             <a:r>
-              <a:t>projects</a:t>
-            </a:r>
-            <a:r>
               <a:rPr>
-                <a:latin typeface="+mn-lt"/>
-                <a:ea typeface="+mn-ea"/>
-                <a:cs typeface="+mn-cs"/>
-                <a:sym typeface="Helvetica"/>
+                <a:latin typeface="+mj-lt"/>
+                <a:ea typeface="+mj-ea"/>
+                <a:cs typeface="+mj-cs"/>
+                <a:sym typeface="Calibri"/>
               </a:rPr>
+              <a:t>teacher_assignments</a:t>
+            </a:r>
+            <a:r>
               <a:t>、</a:t>
             </a:r>
             <a:r>
-              <a:t>teacher_assignments</a:t>
-            </a:r>
-            <a:r>
               <a:rPr>
-                <a:latin typeface="+mn-lt"/>
-                <a:ea typeface="+mn-ea"/>
-                <a:cs typeface="+mn-cs"/>
-                <a:sym typeface="Helvetica"/>
+                <a:latin typeface="+mj-lt"/>
+                <a:ea typeface="+mj-ea"/>
+                <a:cs typeface="+mj-cs"/>
+                <a:sym typeface="Calibri"/>
               </a:rPr>
-              <a:t>、</a:t>
-            </a:r>
-            <a:r>
               <a:t>scores</a:t>
             </a:r>
             <a:r>
-              <a:rPr>
-                <a:latin typeface="+mn-lt"/>
-                <a:ea typeface="+mn-ea"/>
-                <a:cs typeface="+mn-cs"/>
-                <a:sym typeface="Helvetica"/>
-              </a:rPr>
               <a:t>。</a:t>
-            </a:r>
-            <a:endParaRPr>
-              <a:latin typeface="+mn-lt"/>
-              <a:ea typeface="+mn-ea"/>
-              <a:cs typeface="+mn-cs"/>
-              <a:sym typeface="Helvetica"/>
-            </a:endParaRPr>
-          </a:p>
-          <a:p>
-            <a:pPr/>
-            <a:r>
-              <a:rPr>
-                <a:latin typeface="+mn-lt"/>
-                <a:ea typeface="+mn-ea"/>
-                <a:cs typeface="+mn-cs"/>
-                <a:sym typeface="Helvetica"/>
-              </a:rPr>
-              <a:t>特点：外键一致性、复合唯一约束、</a:t>
-            </a:r>
-            <a:r>
-              <a:t>ON DELETE CASCADE</a:t>
-            </a:r>
-            <a:r>
-              <a:rPr>
-                <a:latin typeface="+mn-lt"/>
-                <a:ea typeface="+mn-ea"/>
-                <a:cs typeface="+mn-cs"/>
-                <a:sym typeface="Helvetica"/>
-              </a:rPr>
-              <a:t>、</a:t>
-            </a:r>
-            <a:r>
-              <a:t>UPSERT</a:t>
-            </a:r>
-            <a:r>
-              <a:rPr>
-                <a:latin typeface="+mn-lt"/>
-                <a:ea typeface="+mn-ea"/>
-                <a:cs typeface="+mn-cs"/>
-                <a:sym typeface="Helvetica"/>
-              </a:rPr>
-              <a:t>模式。</a:t>
             </a:r>
           </a:p>
         </p:txBody>
       </p:sp>
+      <p:pic>
+        <p:nvPicPr>
+          <p:cNvPr id="111" name="曾续缘ER图.png" descr="曾续缘ER图.png"/>
+          <p:cNvPicPr>
+            <a:picLocks noChangeAspect="1"/>
+          </p:cNvPicPr>
+          <p:nvPr/>
+        </p:nvPicPr>
+        <p:blipFill>
+          <a:blip r:embed="rId2">
+            <a:extLst/>
+          </a:blip>
+          <a:stretch>
+            <a:fillRect/>
+          </a:stretch>
+        </p:blipFill>
+        <p:spPr>
+          <a:xfrm>
+            <a:off x="1396780" y="3132766"/>
+            <a:ext cx="5431348" cy="3667148"/>
+          </a:xfrm>
+          <a:prstGeom prst="rect">
+            <a:avLst/>
+          </a:prstGeom>
+          <a:ln w="12700">
+            <a:miter lim="400000"/>
+          </a:ln>
+        </p:spPr>
+      </p:pic>
     </p:spTree>
   </p:cSld>
   <p:clrMapOvr>
@@ -4018,13 +3990,17 @@
       </p:grpSpPr>
       <p:sp>
         <p:nvSpPr>
-          <p:cNvPr id="112" name="Title 1"/>
+          <p:cNvPr id="113" name="Title 1"/>
           <p:cNvSpPr txBox="1"/>
           <p:nvPr>
             <p:ph type="title"/>
           </p:nvPr>
         </p:nvSpPr>
         <p:spPr>
+          <a:xfrm>
+            <a:off x="457200" y="274638"/>
+            <a:ext cx="8229600" cy="1143001"/>
+          </a:xfrm>
           <a:prstGeom prst="rect">
             <a:avLst/>
           </a:prstGeom>
@@ -4051,7 +4027,7 @@
       </p:sp>
       <p:sp>
         <p:nvSpPr>
-          <p:cNvPr id="113" name="Content Placeholder 2"/>
+          <p:cNvPr id="114" name="Content Placeholder 2"/>
           <p:cNvSpPr txBox="1"/>
           <p:nvPr>
             <p:ph type="body" idx="1"/>
@@ -4070,122 +4046,113 @@
           <a:bodyPr/>
           <a:lstStyle/>
           <a:p>
-            <a:pPr/>
-            <a:r>
-              <a:rPr>
+            <a:pPr>
+              <a:defRPr>
                 <a:latin typeface="+mn-lt"/>
                 <a:ea typeface="+mn-ea"/>
                 <a:cs typeface="+mn-cs"/>
                 <a:sym typeface="Helvetica"/>
+              </a:defRPr>
+            </a:pPr>
+            <a:r>
+              <a:t>使用</a:t>
+            </a:r>
+            <a:r>
+              <a:rPr>
+                <a:latin typeface="+mj-lt"/>
+                <a:ea typeface="+mj-ea"/>
+                <a:cs typeface="+mj-cs"/>
+                <a:sym typeface="Calibri"/>
               </a:rPr>
-              <a:t>使用</a:t>
-            </a:r>
-            <a:r>
               <a:t>Elysia</a:t>
             </a:r>
             <a:r>
+              <a:t>框架实现</a:t>
+            </a:r>
+            <a:r>
               <a:rPr>
+                <a:latin typeface="+mj-lt"/>
+                <a:ea typeface="+mj-ea"/>
+                <a:cs typeface="+mj-cs"/>
+                <a:sym typeface="Calibri"/>
+              </a:rPr>
+              <a:t>REST API</a:t>
+            </a:r>
+            <a:r>
+              <a:t>。</a:t>
+            </a:r>
+          </a:p>
+          <a:p>
+            <a:pPr>
+              <a:defRPr>
                 <a:latin typeface="+mn-lt"/>
                 <a:ea typeface="+mn-ea"/>
                 <a:cs typeface="+mn-cs"/>
                 <a:sym typeface="Helvetica"/>
+              </a:defRPr>
+            </a:pPr>
+            <a:r>
+              <a:t>模块划分：</a:t>
+            </a:r>
+            <a:r>
+              <a:rPr>
+                <a:latin typeface="+mj-lt"/>
+                <a:ea typeface="+mj-ea"/>
+                <a:cs typeface="+mj-cs"/>
+                <a:sym typeface="Calibri"/>
               </a:rPr>
-              <a:t>框架实现</a:t>
-            </a:r>
-            <a:r>
-              <a:t>REST API</a:t>
+              <a:t>auth</a:t>
+            </a:r>
+            <a:r>
+              <a:t>、</a:t>
             </a:r>
             <a:r>
               <a:rPr>
+                <a:latin typeface="+mj-lt"/>
+                <a:ea typeface="+mj-ea"/>
+                <a:cs typeface="+mj-cs"/>
+                <a:sym typeface="Calibri"/>
+              </a:rPr>
+              <a:t>student</a:t>
+            </a:r>
+            <a:r>
+              <a:t>、</a:t>
+            </a:r>
+            <a:r>
+              <a:rPr>
+                <a:latin typeface="+mj-lt"/>
+                <a:ea typeface="+mj-ea"/>
+                <a:cs typeface="+mj-cs"/>
+                <a:sym typeface="Calibri"/>
+              </a:rPr>
+              <a:t>teacher</a:t>
+            </a:r>
+            <a:r>
+              <a:t>、</a:t>
+            </a:r>
+            <a:r>
+              <a:rPr>
+                <a:latin typeface="+mj-lt"/>
+                <a:ea typeface="+mj-ea"/>
+                <a:cs typeface="+mj-cs"/>
+                <a:sym typeface="Calibri"/>
+              </a:rPr>
+              <a:t>admin</a:t>
+            </a:r>
+            <a:r>
+              <a:t>。</a:t>
+            </a:r>
+          </a:p>
+          <a:p>
+            <a:pPr>
+              <a:defRPr>
                 <a:latin typeface="+mn-lt"/>
                 <a:ea typeface="+mn-ea"/>
                 <a:cs typeface="+mn-cs"/>
                 <a:sym typeface="Helvetica"/>
-              </a:rPr>
-              <a:t>。</a:t>
-            </a:r>
-            <a:endParaRPr>
-              <a:latin typeface="+mn-lt"/>
-              <a:ea typeface="+mn-ea"/>
-              <a:cs typeface="+mn-cs"/>
-              <a:sym typeface="Helvetica"/>
-            </a:endParaRPr>
-          </a:p>
-          <a:p>
-            <a:pPr/>
-            <a:r>
-              <a:rPr>
-                <a:latin typeface="+mn-lt"/>
-                <a:ea typeface="+mn-ea"/>
-                <a:cs typeface="+mn-cs"/>
-                <a:sym typeface="Helvetica"/>
-              </a:rPr>
-              <a:t>模块划分：</a:t>
-            </a:r>
-            <a:r>
-              <a:t>auth</a:t>
-            </a:r>
-            <a:r>
-              <a:rPr>
-                <a:latin typeface="+mn-lt"/>
-                <a:ea typeface="+mn-ea"/>
-                <a:cs typeface="+mn-cs"/>
-                <a:sym typeface="Helvetica"/>
-              </a:rPr>
-              <a:t>、</a:t>
-            </a:r>
-            <a:r>
-              <a:t>student</a:t>
-            </a:r>
-            <a:r>
-              <a:rPr>
-                <a:latin typeface="+mn-lt"/>
-                <a:ea typeface="+mn-ea"/>
-                <a:cs typeface="+mn-cs"/>
-                <a:sym typeface="Helvetica"/>
-              </a:rPr>
-              <a:t>、</a:t>
-            </a:r>
-            <a:r>
-              <a:t>teacher</a:t>
-            </a:r>
-            <a:r>
-              <a:rPr>
-                <a:latin typeface="+mn-lt"/>
-                <a:ea typeface="+mn-ea"/>
-                <a:cs typeface="+mn-cs"/>
-                <a:sym typeface="Helvetica"/>
-              </a:rPr>
-              <a:t>、</a:t>
-            </a:r>
-            <a:r>
-              <a:t>admin</a:t>
-            </a:r>
-            <a:r>
-              <a:rPr>
-                <a:latin typeface="+mn-lt"/>
-                <a:ea typeface="+mn-ea"/>
-                <a:cs typeface="+mn-cs"/>
-                <a:sym typeface="Helvetica"/>
-              </a:rPr>
-              <a:t>。</a:t>
-            </a:r>
-            <a:endParaRPr>
-              <a:latin typeface="+mn-lt"/>
-              <a:ea typeface="+mn-ea"/>
-              <a:cs typeface="+mn-cs"/>
-              <a:sym typeface="Helvetica"/>
-            </a:endParaRPr>
-          </a:p>
-          <a:p>
-            <a:pPr/>
-            <a:r>
-              <a:rPr>
-                <a:latin typeface="+mn-lt"/>
-                <a:ea typeface="+mn-ea"/>
-                <a:cs typeface="+mn-cs"/>
-                <a:sym typeface="Helvetica"/>
-              </a:rPr>
+              </a:defRPr>
+            </a:pPr>
+            <a:r>
               <a:t>核心逻辑：会话校验、幂等写入、角色访问控制、错误日志管理。</a:t>
             </a:r>
           </a:p>
@@ -4219,13 +4186,17 @@
       </p:grpSpPr>
       <p:sp>
         <p:nvSpPr>
-          <p:cNvPr id="115" name="Title 1"/>
+          <p:cNvPr id="116" name="Title 1"/>
           <p:cNvSpPr txBox="1"/>
           <p:nvPr>
             <p:ph type="title"/>
           </p:nvPr>
         </p:nvSpPr>
         <p:spPr>
+          <a:xfrm>
+            <a:off x="457200" y="274638"/>
+            <a:ext cx="8229600" cy="1143001"/>
+          </a:xfrm>
           <a:prstGeom prst="rect">
             <a:avLst/>
           </a:prstGeom>
@@ -4252,7 +4223,7 @@
       </p:sp>
       <p:sp>
         <p:nvSpPr>
-          <p:cNvPr id="116" name="Content Placeholder 2"/>
+          <p:cNvPr id="117" name="Content Placeholder 2"/>
           <p:cNvSpPr txBox="1"/>
           <p:nvPr>
             <p:ph type="body" idx="1"/>
@@ -4304,32 +4275,28 @@
             </a:endParaRPr>
           </a:p>
           <a:p>
-            <a:pPr/>
-            <a:r>
-              <a:rPr>
+            <a:pPr>
+              <a:defRPr>
                 <a:latin typeface="+mn-lt"/>
                 <a:ea typeface="+mn-ea"/>
                 <a:cs typeface="+mn-cs"/>
                 <a:sym typeface="Helvetica"/>
-              </a:rPr>
+              </a:defRPr>
+            </a:pPr>
+            <a:r>
               <a:t>主要页面：登录、学生、教师、管理员。</a:t>
             </a:r>
-            <a:endParaRPr>
-              <a:latin typeface="+mn-lt"/>
-              <a:ea typeface="+mn-ea"/>
-              <a:cs typeface="+mn-cs"/>
-              <a:sym typeface="Helvetica"/>
-            </a:endParaRPr>
-          </a:p>
-          <a:p>
-            <a:pPr/>
-            <a:r>
-              <a:rPr>
+          </a:p>
+          <a:p>
+            <a:pPr>
+              <a:defRPr>
                 <a:latin typeface="+mn-lt"/>
                 <a:ea typeface="+mn-ea"/>
                 <a:cs typeface="+mn-cs"/>
                 <a:sym typeface="Helvetica"/>
-              </a:rPr>
+              </a:defRPr>
+            </a:pPr>
+            <a:r>
               <a:t>统一请求封装与表格渲染、角色跳转与错误提示。</a:t>
             </a:r>
           </a:p>
@@ -4363,13 +4330,17 @@
       </p:grpSpPr>
       <p:sp>
         <p:nvSpPr>
-          <p:cNvPr id="118" name="Title 1"/>
+          <p:cNvPr id="119" name="Title 1"/>
           <p:cNvSpPr txBox="1"/>
           <p:nvPr>
             <p:ph type="title"/>
           </p:nvPr>
         </p:nvSpPr>
         <p:spPr>
+          <a:xfrm>
+            <a:off x="457200" y="274638"/>
+            <a:ext cx="8229600" cy="1143001"/>
+          </a:xfrm>
           <a:prstGeom prst="rect">
             <a:avLst/>
           </a:prstGeom>
@@ -4396,7 +4367,7 @@
       </p:sp>
       <p:sp>
         <p:nvSpPr>
-          <p:cNvPr id="119" name="Content Placeholder 2"/>
+          <p:cNvPr id="120" name="Content Placeholder 2"/>
           <p:cNvSpPr txBox="1"/>
           <p:nvPr>
             <p:ph type="body" idx="1"/>
@@ -4415,22 +4386,17 @@
           <a:bodyPr/>
           <a:lstStyle/>
           <a:p>
-            <a:pPr/>
-            <a:r>
-              <a:rPr>
+            <a:pPr>
+              <a:defRPr>
                 <a:latin typeface="+mn-lt"/>
                 <a:ea typeface="+mn-ea"/>
                 <a:cs typeface="+mn-cs"/>
                 <a:sym typeface="Helvetica"/>
-              </a:rPr>
+              </a:defRPr>
+            </a:pPr>
+            <a:r>
               <a:t>运行步骤：</a:t>
             </a:r>
-            <a:endParaRPr>
-              <a:latin typeface="+mn-lt"/>
-              <a:ea typeface="+mn-ea"/>
-              <a:cs typeface="+mn-cs"/>
-              <a:sym typeface="Helvetica"/>
-            </a:endParaRPr>
           </a:p>
           <a:p>
             <a:pPr/>
@@ -4451,14 +4417,15 @@
             </a:r>
           </a:p>
           <a:p>
-            <a:pPr/>
-            <a:r>
-              <a:rPr>
+            <a:pPr>
+              <a:defRPr>
                 <a:latin typeface="+mn-lt"/>
                 <a:ea typeface="+mn-ea"/>
                 <a:cs typeface="+mn-cs"/>
                 <a:sym typeface="Helvetica"/>
-              </a:rPr>
+              </a:defRPr>
+            </a:pPr>
+            <a:r>
               <a:t>验证：三角色闭环操作、约束测试、并发一致性。</a:t>
             </a:r>
           </a:p>
@@ -4618,9 +4585,9 @@
         </a:effectStyle>
         <a:effectStyle>
           <a:effectLst>
-            <a:outerShdw sx="100000" sy="100000" kx="0" ky="0" algn="b" rotWithShape="0" blurRad="38100" dist="20000" dir="5400000">
+            <a:outerShdw sx="100000" sy="100000" kx="0" ky="0" algn="b" rotWithShape="0" blurRad="38100" dist="23000" dir="5400000">
               <a:srgbClr val="000000">
-                <a:alpha val="38000"/>
+                <a:alpha val="35000"/>
               </a:srgbClr>
             </a:outerShdw>
           </a:effectLst>
@@ -4700,7 +4667,7 @@
         </a:effectLst>
         <a:sp3d/>
       </a:spPr>
-      <a:bodyPr rot="0" spcFirstLastPara="1" vertOverflow="overflow" horzOverflow="overflow" vert="horz" wrap="square" lIns="45719" tIns="45719" rIns="45719" bIns="45719" numCol="1" spcCol="38100" rtlCol="0" anchor="ctr" upright="0">
+      <a:bodyPr rot="0" spcFirstLastPara="1" vertOverflow="overflow" horzOverflow="overflow" vert="horz" wrap="square" lIns="45718" tIns="45718" rIns="45718" bIns="45718" numCol="1" spcCol="38100" rtlCol="0" anchor="ctr" upright="0">
         <a:spAutoFit/>
       </a:bodyPr>
       <a:lstStyle>
@@ -4728,10 +4695,10 @@
             </a:solidFill>
             <a:effectLst/>
             <a:uFillTx/>
-            <a:latin typeface="+mj-lt"/>
-            <a:ea typeface="+mj-ea"/>
-            <a:cs typeface="+mj-cs"/>
-            <a:sym typeface="Calibri"/>
+            <a:latin typeface="+mn-lt"/>
+            <a:ea typeface="+mn-ea"/>
+            <a:cs typeface="+mn-cs"/>
+            <a:sym typeface="Helvetica"/>
           </a:defRPr>
         </a:defPPr>
         <a:lvl1pPr marL="0" marR="0" indent="0" algn="l" defTabSz="914400" rtl="0" fontAlgn="auto" latinLnBrk="1" hangingPunct="0">
@@ -4987,9 +4954,9 @@
           <a:round/>
         </a:ln>
         <a:effectLst>
-          <a:outerShdw sx="100000" sy="100000" kx="0" ky="0" algn="b" rotWithShape="0" blurRad="38100" dist="20000" dir="5400000">
+          <a:outerShdw sx="100000" sy="100000" kx="0" ky="0" algn="b" rotWithShape="0" blurRad="38100" dist="23000" dir="5400000">
             <a:srgbClr val="000000">
-              <a:alpha val="38000"/>
+              <a:alpha val="35000"/>
             </a:srgbClr>
           </a:outerShdw>
         </a:effectLst>
@@ -5277,7 +5244,7 @@
         <a:effectLst/>
         <a:sp3d/>
       </a:spPr>
-      <a:bodyPr rot="0" spcFirstLastPara="1" vertOverflow="overflow" horzOverflow="overflow" vert="horz" wrap="square" lIns="45719" tIns="45719" rIns="45719" bIns="45719" numCol="1" spcCol="38100" rtlCol="0" anchor="t" upright="0">
+      <a:bodyPr rot="0" spcFirstLastPara="1" vertOverflow="overflow" horzOverflow="overflow" vert="horz" wrap="square" lIns="45718" tIns="45718" rIns="45718" bIns="45718" numCol="1" spcCol="38100" rtlCol="0" anchor="t" upright="0">
         <a:spAutoFit/>
       </a:bodyPr>
       <a:lstStyle>
@@ -5305,10 +5272,10 @@
             </a:solidFill>
             <a:effectLst/>
             <a:uFillTx/>
-            <a:latin typeface="+mj-lt"/>
-            <a:ea typeface="+mj-ea"/>
-            <a:cs typeface="+mj-cs"/>
-            <a:sym typeface="Calibri"/>
+            <a:latin typeface="+mn-lt"/>
+            <a:ea typeface="+mn-ea"/>
+            <a:cs typeface="+mn-cs"/>
+            <a:sym typeface="Helvetica"/>
           </a:defRPr>
         </a:defPPr>
         <a:lvl1pPr marL="0" marR="0" indent="0" algn="l" defTabSz="914400" rtl="0" fontAlgn="auto" latinLnBrk="1" hangingPunct="0">
@@ -5702,9 +5669,9 @@
         </a:effectStyle>
         <a:effectStyle>
           <a:effectLst>
-            <a:outerShdw sx="100000" sy="100000" kx="0" ky="0" algn="b" rotWithShape="0" blurRad="38100" dist="20000" dir="5400000">
+            <a:outerShdw sx="100000" sy="100000" kx="0" ky="0" algn="b" rotWithShape="0" blurRad="38100" dist="23000" dir="5400000">
               <a:srgbClr val="000000">
-                <a:alpha val="38000"/>
+                <a:alpha val="35000"/>
               </a:srgbClr>
             </a:outerShdw>
           </a:effectLst>
@@ -5784,7 +5751,7 @@
         </a:effectLst>
         <a:sp3d/>
       </a:spPr>
-      <a:bodyPr rot="0" spcFirstLastPara="1" vertOverflow="overflow" horzOverflow="overflow" vert="horz" wrap="square" lIns="45719" tIns="45719" rIns="45719" bIns="45719" numCol="1" spcCol="38100" rtlCol="0" anchor="ctr" upright="0">
+      <a:bodyPr rot="0" spcFirstLastPara="1" vertOverflow="overflow" horzOverflow="overflow" vert="horz" wrap="square" lIns="45718" tIns="45718" rIns="45718" bIns="45718" numCol="1" spcCol="38100" rtlCol="0" anchor="ctr" upright="0">
         <a:spAutoFit/>
       </a:bodyPr>
       <a:lstStyle>
@@ -5812,10 +5779,10 @@
             </a:solidFill>
             <a:effectLst/>
             <a:uFillTx/>
-            <a:latin typeface="+mj-lt"/>
-            <a:ea typeface="+mj-ea"/>
-            <a:cs typeface="+mj-cs"/>
-            <a:sym typeface="Calibri"/>
+            <a:latin typeface="+mn-lt"/>
+            <a:ea typeface="+mn-ea"/>
+            <a:cs typeface="+mn-cs"/>
+            <a:sym typeface="Helvetica"/>
           </a:defRPr>
         </a:defPPr>
         <a:lvl1pPr marL="0" marR="0" indent="0" algn="l" defTabSz="914400" rtl="0" fontAlgn="auto" latinLnBrk="1" hangingPunct="0">
@@ -6071,9 +6038,9 @@
           <a:round/>
         </a:ln>
         <a:effectLst>
-          <a:outerShdw sx="100000" sy="100000" kx="0" ky="0" algn="b" rotWithShape="0" blurRad="38100" dist="20000" dir="5400000">
+          <a:outerShdw sx="100000" sy="100000" kx="0" ky="0" algn="b" rotWithShape="0" blurRad="38100" dist="23000" dir="5400000">
             <a:srgbClr val="000000">
-              <a:alpha val="38000"/>
+              <a:alpha val="35000"/>
             </a:srgbClr>
           </a:outerShdw>
         </a:effectLst>
@@ -6361,7 +6328,7 @@
         <a:effectLst/>
         <a:sp3d/>
       </a:spPr>
-      <a:bodyPr rot="0" spcFirstLastPara="1" vertOverflow="overflow" horzOverflow="overflow" vert="horz" wrap="square" lIns="45719" tIns="45719" rIns="45719" bIns="45719" numCol="1" spcCol="38100" rtlCol="0" anchor="t" upright="0">
+      <a:bodyPr rot="0" spcFirstLastPara="1" vertOverflow="overflow" horzOverflow="overflow" vert="horz" wrap="square" lIns="45718" tIns="45718" rIns="45718" bIns="45718" numCol="1" spcCol="38100" rtlCol="0" anchor="t" upright="0">
         <a:spAutoFit/>
       </a:bodyPr>
       <a:lstStyle>
@@ -6389,10 +6356,10 @@
             </a:solidFill>
             <a:effectLst/>
             <a:uFillTx/>
-            <a:latin typeface="+mj-lt"/>
-            <a:ea typeface="+mj-ea"/>
-            <a:cs typeface="+mj-cs"/>
-            <a:sym typeface="Calibri"/>
+            <a:latin typeface="+mn-lt"/>
+            <a:ea typeface="+mn-ea"/>
+            <a:cs typeface="+mn-cs"/>
+            <a:sym typeface="Helvetica"/>
           </a:defRPr>
         </a:defPPr>
         <a:lvl1pPr marL="0" marR="0" indent="0" algn="l" defTabSz="914400" rtl="0" fontAlgn="auto" latinLnBrk="1" hangingPunct="0">

</xml_diff>